<commit_message>
docs: update presentation (#115)
</commit_message>
<xml_diff>
--- a/docs/presentations/Service_Release_Manager_Final.pptx
+++ b/docs/presentations/Service_Release_Manager_Final.pptx
@@ -2790,7 +2790,7 @@
           <a:p>
             <a:fld id="{7935CA95-931C-EC46-822F-44CD3AAAD683}" type="datetimeFigureOut">
               <a:rPr lang="en-DE" smtClean="0"/>
-              <a:t>06/30/2022</a:t>
+              <a:t>30.06.22</a:t>
             </a:fld>
             <a:endParaRPr lang="en-DE"/>
           </a:p>
@@ -2949,7 +2949,7 @@
           <a:p>
             <a:fld id="{844F32EA-7D6E-F743-B40F-CE4285130E17}" type="slidenum">
               <a:rPr lang="en-DE" smtClean="0"/>
-              <a:t>‹Nr.›</a:t>
+              <a:t>‹#›</a:t>
             </a:fld>
             <a:endParaRPr lang="en-DE"/>
           </a:p>
@@ -5591,7 +5591,7 @@
           <a:p>
             <a:fld id="{CA322229-C50A-448D-9949-3EEB7AB801DC}" type="datetimeFigureOut">
               <a:rPr lang="de-DE" smtClean="0"/>
-              <a:t>30.06.2022</a:t>
+              <a:t>30.06.22</a:t>
             </a:fld>
             <a:endParaRPr lang="de-DE"/>
           </a:p>
@@ -5645,7 +5645,7 @@
           <a:p>
             <a:fld id="{ECA46417-5E09-4EBA-9F68-AC32A47CD02A}" type="slidenum">
               <a:rPr lang="de-DE" smtClean="0"/>
-              <a:t>‹Nr.›</a:t>
+              <a:t>‹#›</a:t>
             </a:fld>
             <a:endParaRPr lang="de-DE"/>
           </a:p>
@@ -5789,7 +5789,7 @@
           <a:p>
             <a:fld id="{CA322229-C50A-448D-9949-3EEB7AB801DC}" type="datetimeFigureOut">
               <a:rPr lang="de-DE" smtClean="0"/>
-              <a:t>30.06.2022</a:t>
+              <a:t>30.06.22</a:t>
             </a:fld>
             <a:endParaRPr lang="de-DE"/>
           </a:p>
@@ -5843,7 +5843,7 @@
           <a:p>
             <a:fld id="{ECA46417-5E09-4EBA-9F68-AC32A47CD02A}" type="slidenum">
               <a:rPr lang="de-DE" smtClean="0"/>
-              <a:t>‹Nr.›</a:t>
+              <a:t>‹#›</a:t>
             </a:fld>
             <a:endParaRPr lang="de-DE"/>
           </a:p>
@@ -5997,7 +5997,7 @@
           <a:p>
             <a:fld id="{CA322229-C50A-448D-9949-3EEB7AB801DC}" type="datetimeFigureOut">
               <a:rPr lang="de-DE" smtClean="0"/>
-              <a:t>30.06.2022</a:t>
+              <a:t>30.06.22</a:t>
             </a:fld>
             <a:endParaRPr lang="de-DE"/>
           </a:p>
@@ -6051,7 +6051,7 @@
           <a:p>
             <a:fld id="{ECA46417-5E09-4EBA-9F68-AC32A47CD02A}" type="slidenum">
               <a:rPr lang="de-DE" smtClean="0"/>
-              <a:t>‹Nr.›</a:t>
+              <a:t>‹#›</a:t>
             </a:fld>
             <a:endParaRPr lang="de-DE"/>
           </a:p>
@@ -6195,7 +6195,7 @@
           <a:p>
             <a:fld id="{CA322229-C50A-448D-9949-3EEB7AB801DC}" type="datetimeFigureOut">
               <a:rPr lang="de-DE" smtClean="0"/>
-              <a:t>30.06.2022</a:t>
+              <a:t>30.06.22</a:t>
             </a:fld>
             <a:endParaRPr lang="de-DE"/>
           </a:p>
@@ -6249,7 +6249,7 @@
           <a:p>
             <a:fld id="{ECA46417-5E09-4EBA-9F68-AC32A47CD02A}" type="slidenum">
               <a:rPr lang="de-DE" smtClean="0"/>
-              <a:t>‹Nr.›</a:t>
+              <a:t>‹#›</a:t>
             </a:fld>
             <a:endParaRPr lang="de-DE"/>
           </a:p>
@@ -6470,7 +6470,7 @@
           <a:p>
             <a:fld id="{CA322229-C50A-448D-9949-3EEB7AB801DC}" type="datetimeFigureOut">
               <a:rPr lang="de-DE" smtClean="0"/>
-              <a:t>30.06.2022</a:t>
+              <a:t>30.06.22</a:t>
             </a:fld>
             <a:endParaRPr lang="de-DE"/>
           </a:p>
@@ -6524,7 +6524,7 @@
           <a:p>
             <a:fld id="{ECA46417-5E09-4EBA-9F68-AC32A47CD02A}" type="slidenum">
               <a:rPr lang="de-DE" smtClean="0"/>
-              <a:t>‹Nr.›</a:t>
+              <a:t>‹#›</a:t>
             </a:fld>
             <a:endParaRPr lang="de-DE"/>
           </a:p>
@@ -6735,7 +6735,7 @@
           <a:p>
             <a:fld id="{CA322229-C50A-448D-9949-3EEB7AB801DC}" type="datetimeFigureOut">
               <a:rPr lang="de-DE" smtClean="0"/>
-              <a:t>30.06.2022</a:t>
+              <a:t>30.06.22</a:t>
             </a:fld>
             <a:endParaRPr lang="de-DE"/>
           </a:p>
@@ -6789,7 +6789,7 @@
           <a:p>
             <a:fld id="{ECA46417-5E09-4EBA-9F68-AC32A47CD02A}" type="slidenum">
               <a:rPr lang="de-DE" smtClean="0"/>
-              <a:t>‹Nr.›</a:t>
+              <a:t>‹#›</a:t>
             </a:fld>
             <a:endParaRPr lang="de-DE"/>
           </a:p>
@@ -7147,7 +7147,7 @@
           <a:p>
             <a:fld id="{CA322229-C50A-448D-9949-3EEB7AB801DC}" type="datetimeFigureOut">
               <a:rPr lang="de-DE" smtClean="0"/>
-              <a:t>30.06.2022</a:t>
+              <a:t>30.06.22</a:t>
             </a:fld>
             <a:endParaRPr lang="de-DE"/>
           </a:p>
@@ -7201,7 +7201,7 @@
           <a:p>
             <a:fld id="{ECA46417-5E09-4EBA-9F68-AC32A47CD02A}" type="slidenum">
               <a:rPr lang="de-DE" smtClean="0"/>
-              <a:t>‹Nr.›</a:t>
+              <a:t>‹#›</a:t>
             </a:fld>
             <a:endParaRPr lang="de-DE"/>
           </a:p>
@@ -7288,7 +7288,7 @@
           <a:p>
             <a:fld id="{CA322229-C50A-448D-9949-3EEB7AB801DC}" type="datetimeFigureOut">
               <a:rPr lang="de-DE" smtClean="0"/>
-              <a:t>30.06.2022</a:t>
+              <a:t>30.06.22</a:t>
             </a:fld>
             <a:endParaRPr lang="de-DE"/>
           </a:p>
@@ -7342,7 +7342,7 @@
           <a:p>
             <a:fld id="{ECA46417-5E09-4EBA-9F68-AC32A47CD02A}" type="slidenum">
               <a:rPr lang="de-DE" smtClean="0"/>
-              <a:t>‹Nr.›</a:t>
+              <a:t>‹#›</a:t>
             </a:fld>
             <a:endParaRPr lang="de-DE"/>
           </a:p>
@@ -7401,7 +7401,7 @@
           <a:p>
             <a:fld id="{CA322229-C50A-448D-9949-3EEB7AB801DC}" type="datetimeFigureOut">
               <a:rPr lang="de-DE" smtClean="0"/>
-              <a:t>30.06.2022</a:t>
+              <a:t>30.06.22</a:t>
             </a:fld>
             <a:endParaRPr lang="de-DE"/>
           </a:p>
@@ -7455,7 +7455,7 @@
           <a:p>
             <a:fld id="{ECA46417-5E09-4EBA-9F68-AC32A47CD02A}" type="slidenum">
               <a:rPr lang="de-DE" smtClean="0"/>
-              <a:t>‹Nr.›</a:t>
+              <a:t>‹#›</a:t>
             </a:fld>
             <a:endParaRPr lang="de-DE"/>
           </a:p>
@@ -7712,7 +7712,7 @@
           <a:p>
             <a:fld id="{CA322229-C50A-448D-9949-3EEB7AB801DC}" type="datetimeFigureOut">
               <a:rPr lang="de-DE" smtClean="0"/>
-              <a:t>30.06.2022</a:t>
+              <a:t>30.06.22</a:t>
             </a:fld>
             <a:endParaRPr lang="de-DE"/>
           </a:p>
@@ -7766,7 +7766,7 @@
           <a:p>
             <a:fld id="{ECA46417-5E09-4EBA-9F68-AC32A47CD02A}" type="slidenum">
               <a:rPr lang="de-DE" smtClean="0"/>
-              <a:t>‹Nr.›</a:t>
+              <a:t>‹#›</a:t>
             </a:fld>
             <a:endParaRPr lang="de-DE"/>
           </a:p>
@@ -8000,7 +8000,7 @@
           <a:p>
             <a:fld id="{CA322229-C50A-448D-9949-3EEB7AB801DC}" type="datetimeFigureOut">
               <a:rPr lang="de-DE" smtClean="0"/>
-              <a:t>30.06.2022</a:t>
+              <a:t>30.06.22</a:t>
             </a:fld>
             <a:endParaRPr lang="de-DE"/>
           </a:p>
@@ -8054,7 +8054,7 @@
           <a:p>
             <a:fld id="{ECA46417-5E09-4EBA-9F68-AC32A47CD02A}" type="slidenum">
               <a:rPr lang="de-DE" smtClean="0"/>
-              <a:t>‹Nr.›</a:t>
+              <a:t>‹#›</a:t>
             </a:fld>
             <a:endParaRPr lang="de-DE"/>
           </a:p>
@@ -8241,7 +8241,7 @@
           <a:p>
             <a:fld id="{CA322229-C50A-448D-9949-3EEB7AB801DC}" type="datetimeFigureOut">
               <a:rPr lang="de-DE" smtClean="0"/>
-              <a:t>30.06.2022</a:t>
+              <a:t>30.06.22</a:t>
             </a:fld>
             <a:endParaRPr lang="de-DE"/>
           </a:p>
@@ -8331,7 +8331,7 @@
           <a:p>
             <a:fld id="{ECA46417-5E09-4EBA-9F68-AC32A47CD02A}" type="slidenum">
               <a:rPr lang="de-DE" smtClean="0"/>
-              <a:t>‹Nr.›</a:t>
+              <a:t>‹#›</a:t>
             </a:fld>
             <a:endParaRPr lang="de-DE"/>
           </a:p>
@@ -12170,8 +12170,8 @@
         </p:nvSpPr>
         <p:spPr>
           <a:xfrm>
-            <a:off x="838200" y="1825625"/>
-            <a:ext cx="5257800" cy="4351338"/>
+            <a:off x="275573" y="1825625"/>
+            <a:ext cx="5820427" cy="4351338"/>
           </a:xfrm>
         </p:spPr>
         <p:txBody>
@@ -12198,6 +12198,36 @@
           <a:p>
             <a:pPr lvl="1"/>
             <a:r>
+              <a:rPr lang="de-DE" dirty="0" err="1"/>
+              <a:t>Endpoint</a:t>
+            </a:r>
+            <a:r>
+              <a:rPr lang="de-DE" dirty="0"/>
+              <a:t> Basisklasse (Versionierung, Namespace &amp; Route Transformer)</a:t>
+            </a:r>
+          </a:p>
+          <a:p>
+            <a:pPr lvl="1"/>
+            <a:r>
+              <a:rPr lang="de-DE" dirty="0"/>
+              <a:t>Domain Aggregates</a:t>
+            </a:r>
+          </a:p>
+          <a:p>
+            <a:pPr lvl="1"/>
+            <a:r>
+              <a:rPr lang="de-DE" dirty="0"/>
+              <a:t>Release Metadaten Schema &amp; </a:t>
+            </a:r>
+            <a:r>
+              <a:rPr lang="de-DE" dirty="0" err="1"/>
+              <a:t>Validator</a:t>
+            </a:r>
+            <a:endParaRPr lang="de-DE" dirty="0"/>
+          </a:p>
+          <a:p>
+            <a:pPr lvl="1"/>
+            <a:r>
               <a:rPr lang="de-DE" dirty="0"/>
               <a:t>Frontend</a:t>
             </a:r>
@@ -12205,12 +12235,8 @@
           <a:p>
             <a:pPr lvl="1"/>
             <a:r>
-              <a:rPr lang="de-DE" dirty="0" err="1"/>
-              <a:t>Keycloak</a:t>
-            </a:r>
-            <a:r>
               <a:rPr lang="de-DE" dirty="0"/>
-              <a:t> </a:t>
+              <a:t>Code Review</a:t>
             </a:r>
           </a:p>
         </p:txBody>
@@ -12231,8 +12257,8 @@
         </p:nvSpPr>
         <p:spPr>
           <a:xfrm>
-            <a:off x="6096000" y="1818734"/>
-            <a:ext cx="5257800" cy="4351338"/>
+            <a:off x="6096000" y="1818733"/>
+            <a:ext cx="5820426" cy="4674141"/>
           </a:xfrm>
           <a:prstGeom prst="rect">
             <a:avLst/>
@@ -12240,7 +12266,7 @@
         </p:spPr>
         <p:txBody>
           <a:bodyPr vert="horz" lIns="91440" tIns="45720" rIns="91440" bIns="45720" rtlCol="0">
-            <a:normAutofit/>
+            <a:normAutofit lnSpcReduction="10000"/>
           </a:bodyPr>
           <a:lstStyle>
             <a:lvl1pPr marL="228600" indent="-228600" algn="l" defTabSz="914400" rtl="0" eaLnBrk="1" latinLnBrk="0" hangingPunct="1">
@@ -12426,18 +12452,6 @@
             <a:pPr lvl="1"/>
             <a:r>
               <a:rPr lang="de-DE" dirty="0"/>
-              <a:t>CI / </a:t>
-            </a:r>
-            <a:r>
-              <a:rPr lang="de-DE" dirty="0" err="1"/>
-              <a:t>Deployment</a:t>
-            </a:r>
-            <a:endParaRPr lang="de-DE" dirty="0"/>
-          </a:p>
-          <a:p>
-            <a:pPr lvl="1"/>
-            <a:r>
-              <a:rPr lang="de-DE" dirty="0"/>
               <a:t>API Endpoints: </a:t>
             </a:r>
             <a:r>
@@ -12446,8 +12460,44 @@
             </a:r>
             <a:r>
               <a:rPr lang="de-DE" dirty="0"/>
-              <a:t> / Hilfe bei weiteren Endpoints</a:t>
-            </a:r>
+              <a:t>, Service User</a:t>
+            </a:r>
+          </a:p>
+          <a:p>
+            <a:pPr lvl="1"/>
+            <a:r>
+              <a:rPr lang="de-DE" dirty="0"/>
+              <a:t>Architektur</a:t>
+            </a:r>
+          </a:p>
+          <a:p>
+            <a:pPr lvl="1"/>
+            <a:r>
+              <a:rPr lang="de-DE" dirty="0"/>
+              <a:t>CI / CD für Frontend &amp; Backend</a:t>
+            </a:r>
+          </a:p>
+          <a:p>
+            <a:pPr lvl="1"/>
+            <a:r>
+              <a:rPr lang="de-DE" dirty="0"/>
+              <a:t>Domain Aggregates</a:t>
+            </a:r>
+          </a:p>
+          <a:p>
+            <a:pPr lvl="1"/>
+            <a:r>
+              <a:rPr lang="de-DE" dirty="0"/>
+              <a:t>Terraform</a:t>
+            </a:r>
+          </a:p>
+          <a:p>
+            <a:pPr lvl="1"/>
+            <a:r>
+              <a:rPr lang="de-DE" dirty="0" err="1"/>
+              <a:t>Keycloak</a:t>
+            </a:r>
+            <a:endParaRPr lang="de-DE" dirty="0"/>
           </a:p>
           <a:p>
             <a:pPr lvl="1"/>
@@ -12457,12 +12507,13 @@
             </a:r>
           </a:p>
           <a:p>
-            <a:endParaRPr lang="de-DE" dirty="0"/>
-          </a:p>
-          <a:p>
-            <a:pPr marL="0" indent="0">
-              <a:buNone/>
-            </a:pPr>
+            <a:pPr lvl="1"/>
+            <a:r>
+              <a:rPr lang="de-DE" dirty="0"/>
+              <a:t>Code Review</a:t>
+            </a:r>
+          </a:p>
+          <a:p>
             <a:endParaRPr lang="de-DE" dirty="0"/>
           </a:p>
         </p:txBody>

</xml_diff>

<commit_message>
docs: Added Changelog Endpoint
</commit_message>
<xml_diff>
--- a/docs/presentations/Service_Release_Manager_Final.pptx
+++ b/docs/presentations/Service_Release_Manager_Final.pptx
@@ -20,8 +20,8 @@
     <p:sldId id="294" r:id="rId11"/>
     <p:sldId id="292" r:id="rId12"/>
     <p:sldId id="291" r:id="rId13"/>
-    <p:sldId id="317" r:id="rId14"/>
-    <p:sldId id="299" r:id="rId15"/>
+    <p:sldId id="299" r:id="rId14"/>
+    <p:sldId id="317" r:id="rId15"/>
     <p:sldId id="300" r:id="rId16"/>
     <p:sldId id="301" r:id="rId17"/>
     <p:sldId id="302" r:id="rId18"/>
@@ -2790,7 +2790,7 @@
           <a:p>
             <a:fld id="{7935CA95-931C-EC46-822F-44CD3AAAD683}" type="datetimeFigureOut">
               <a:rPr lang="en-DE" smtClean="0"/>
-              <a:t>30.06.22</a:t>
+              <a:t>07/01/2022</a:t>
             </a:fld>
             <a:endParaRPr lang="en-DE"/>
           </a:p>
@@ -2949,7 +2949,7 @@
           <a:p>
             <a:fld id="{844F32EA-7D6E-F743-B40F-CE4285130E17}" type="slidenum">
               <a:rPr lang="en-DE" smtClean="0"/>
-              <a:t>‹#›</a:t>
+              <a:t>‹Nr.›</a:t>
             </a:fld>
             <a:endParaRPr lang="en-DE"/>
           </a:p>
@@ -3535,7 +3535,7 @@
     </p:spTree>
     <p:extLst>
       <p:ext uri="{BB962C8B-B14F-4D97-AF65-F5344CB8AC3E}">
-        <p14:creationId xmlns:p14="http://schemas.microsoft.com/office/powerpoint/2010/main" val="1220929819"/>
+        <p14:creationId xmlns:p14="http://schemas.microsoft.com/office/powerpoint/2010/main" val="3786725649"/>
       </p:ext>
     </p:extLst>
   </p:cSld>
@@ -3626,7 +3626,7 @@
     </p:spTree>
     <p:extLst>
       <p:ext uri="{BB962C8B-B14F-4D97-AF65-F5344CB8AC3E}">
-        <p14:creationId xmlns:p14="http://schemas.microsoft.com/office/powerpoint/2010/main" val="3786725649"/>
+        <p14:creationId xmlns:p14="http://schemas.microsoft.com/office/powerpoint/2010/main" val="1220929819"/>
       </p:ext>
     </p:extLst>
   </p:cSld>
@@ -5591,7 +5591,7 @@
           <a:p>
             <a:fld id="{CA322229-C50A-448D-9949-3EEB7AB801DC}" type="datetimeFigureOut">
               <a:rPr lang="de-DE" smtClean="0"/>
-              <a:t>30.06.22</a:t>
+              <a:t>01.07.2022</a:t>
             </a:fld>
             <a:endParaRPr lang="de-DE"/>
           </a:p>
@@ -5645,7 +5645,7 @@
           <a:p>
             <a:fld id="{ECA46417-5E09-4EBA-9F68-AC32A47CD02A}" type="slidenum">
               <a:rPr lang="de-DE" smtClean="0"/>
-              <a:t>‹#›</a:t>
+              <a:t>‹Nr.›</a:t>
             </a:fld>
             <a:endParaRPr lang="de-DE"/>
           </a:p>
@@ -5789,7 +5789,7 @@
           <a:p>
             <a:fld id="{CA322229-C50A-448D-9949-3EEB7AB801DC}" type="datetimeFigureOut">
               <a:rPr lang="de-DE" smtClean="0"/>
-              <a:t>30.06.22</a:t>
+              <a:t>01.07.2022</a:t>
             </a:fld>
             <a:endParaRPr lang="de-DE"/>
           </a:p>
@@ -5843,7 +5843,7 @@
           <a:p>
             <a:fld id="{ECA46417-5E09-4EBA-9F68-AC32A47CD02A}" type="slidenum">
               <a:rPr lang="de-DE" smtClean="0"/>
-              <a:t>‹#›</a:t>
+              <a:t>‹Nr.›</a:t>
             </a:fld>
             <a:endParaRPr lang="de-DE"/>
           </a:p>
@@ -5997,7 +5997,7 @@
           <a:p>
             <a:fld id="{CA322229-C50A-448D-9949-3EEB7AB801DC}" type="datetimeFigureOut">
               <a:rPr lang="de-DE" smtClean="0"/>
-              <a:t>30.06.22</a:t>
+              <a:t>01.07.2022</a:t>
             </a:fld>
             <a:endParaRPr lang="de-DE"/>
           </a:p>
@@ -6051,7 +6051,7 @@
           <a:p>
             <a:fld id="{ECA46417-5E09-4EBA-9F68-AC32A47CD02A}" type="slidenum">
               <a:rPr lang="de-DE" smtClean="0"/>
-              <a:t>‹#›</a:t>
+              <a:t>‹Nr.›</a:t>
             </a:fld>
             <a:endParaRPr lang="de-DE"/>
           </a:p>
@@ -6195,7 +6195,7 @@
           <a:p>
             <a:fld id="{CA322229-C50A-448D-9949-3EEB7AB801DC}" type="datetimeFigureOut">
               <a:rPr lang="de-DE" smtClean="0"/>
-              <a:t>30.06.22</a:t>
+              <a:t>01.07.2022</a:t>
             </a:fld>
             <a:endParaRPr lang="de-DE"/>
           </a:p>
@@ -6249,7 +6249,7 @@
           <a:p>
             <a:fld id="{ECA46417-5E09-4EBA-9F68-AC32A47CD02A}" type="slidenum">
               <a:rPr lang="de-DE" smtClean="0"/>
-              <a:t>‹#›</a:t>
+              <a:t>‹Nr.›</a:t>
             </a:fld>
             <a:endParaRPr lang="de-DE"/>
           </a:p>
@@ -6470,7 +6470,7 @@
           <a:p>
             <a:fld id="{CA322229-C50A-448D-9949-3EEB7AB801DC}" type="datetimeFigureOut">
               <a:rPr lang="de-DE" smtClean="0"/>
-              <a:t>30.06.22</a:t>
+              <a:t>01.07.2022</a:t>
             </a:fld>
             <a:endParaRPr lang="de-DE"/>
           </a:p>
@@ -6524,7 +6524,7 @@
           <a:p>
             <a:fld id="{ECA46417-5E09-4EBA-9F68-AC32A47CD02A}" type="slidenum">
               <a:rPr lang="de-DE" smtClean="0"/>
-              <a:t>‹#›</a:t>
+              <a:t>‹Nr.›</a:t>
             </a:fld>
             <a:endParaRPr lang="de-DE"/>
           </a:p>
@@ -6735,7 +6735,7 @@
           <a:p>
             <a:fld id="{CA322229-C50A-448D-9949-3EEB7AB801DC}" type="datetimeFigureOut">
               <a:rPr lang="de-DE" smtClean="0"/>
-              <a:t>30.06.22</a:t>
+              <a:t>01.07.2022</a:t>
             </a:fld>
             <a:endParaRPr lang="de-DE"/>
           </a:p>
@@ -6789,7 +6789,7 @@
           <a:p>
             <a:fld id="{ECA46417-5E09-4EBA-9F68-AC32A47CD02A}" type="slidenum">
               <a:rPr lang="de-DE" smtClean="0"/>
-              <a:t>‹#›</a:t>
+              <a:t>‹Nr.›</a:t>
             </a:fld>
             <a:endParaRPr lang="de-DE"/>
           </a:p>
@@ -7147,7 +7147,7 @@
           <a:p>
             <a:fld id="{CA322229-C50A-448D-9949-3EEB7AB801DC}" type="datetimeFigureOut">
               <a:rPr lang="de-DE" smtClean="0"/>
-              <a:t>30.06.22</a:t>
+              <a:t>01.07.2022</a:t>
             </a:fld>
             <a:endParaRPr lang="de-DE"/>
           </a:p>
@@ -7201,7 +7201,7 @@
           <a:p>
             <a:fld id="{ECA46417-5E09-4EBA-9F68-AC32A47CD02A}" type="slidenum">
               <a:rPr lang="de-DE" smtClean="0"/>
-              <a:t>‹#›</a:t>
+              <a:t>‹Nr.›</a:t>
             </a:fld>
             <a:endParaRPr lang="de-DE"/>
           </a:p>
@@ -7288,7 +7288,7 @@
           <a:p>
             <a:fld id="{CA322229-C50A-448D-9949-3EEB7AB801DC}" type="datetimeFigureOut">
               <a:rPr lang="de-DE" smtClean="0"/>
-              <a:t>30.06.22</a:t>
+              <a:t>01.07.2022</a:t>
             </a:fld>
             <a:endParaRPr lang="de-DE"/>
           </a:p>
@@ -7342,7 +7342,7 @@
           <a:p>
             <a:fld id="{ECA46417-5E09-4EBA-9F68-AC32A47CD02A}" type="slidenum">
               <a:rPr lang="de-DE" smtClean="0"/>
-              <a:t>‹#›</a:t>
+              <a:t>‹Nr.›</a:t>
             </a:fld>
             <a:endParaRPr lang="de-DE"/>
           </a:p>
@@ -7401,7 +7401,7 @@
           <a:p>
             <a:fld id="{CA322229-C50A-448D-9949-3EEB7AB801DC}" type="datetimeFigureOut">
               <a:rPr lang="de-DE" smtClean="0"/>
-              <a:t>30.06.22</a:t>
+              <a:t>01.07.2022</a:t>
             </a:fld>
             <a:endParaRPr lang="de-DE"/>
           </a:p>
@@ -7455,7 +7455,7 @@
           <a:p>
             <a:fld id="{ECA46417-5E09-4EBA-9F68-AC32A47CD02A}" type="slidenum">
               <a:rPr lang="de-DE" smtClean="0"/>
-              <a:t>‹#›</a:t>
+              <a:t>‹Nr.›</a:t>
             </a:fld>
             <a:endParaRPr lang="de-DE"/>
           </a:p>
@@ -7712,7 +7712,7 @@
           <a:p>
             <a:fld id="{CA322229-C50A-448D-9949-3EEB7AB801DC}" type="datetimeFigureOut">
               <a:rPr lang="de-DE" smtClean="0"/>
-              <a:t>30.06.22</a:t>
+              <a:t>01.07.2022</a:t>
             </a:fld>
             <a:endParaRPr lang="de-DE"/>
           </a:p>
@@ -7766,7 +7766,7 @@
           <a:p>
             <a:fld id="{ECA46417-5E09-4EBA-9F68-AC32A47CD02A}" type="slidenum">
               <a:rPr lang="de-DE" smtClean="0"/>
-              <a:t>‹#›</a:t>
+              <a:t>‹Nr.›</a:t>
             </a:fld>
             <a:endParaRPr lang="de-DE"/>
           </a:p>
@@ -8000,7 +8000,7 @@
           <a:p>
             <a:fld id="{CA322229-C50A-448D-9949-3EEB7AB801DC}" type="datetimeFigureOut">
               <a:rPr lang="de-DE" smtClean="0"/>
-              <a:t>30.06.22</a:t>
+              <a:t>01.07.2022</a:t>
             </a:fld>
             <a:endParaRPr lang="de-DE"/>
           </a:p>
@@ -8054,7 +8054,7 @@
           <a:p>
             <a:fld id="{ECA46417-5E09-4EBA-9F68-AC32A47CD02A}" type="slidenum">
               <a:rPr lang="de-DE" smtClean="0"/>
-              <a:t>‹#›</a:t>
+              <a:t>‹Nr.›</a:t>
             </a:fld>
             <a:endParaRPr lang="de-DE"/>
           </a:p>
@@ -8241,7 +8241,7 @@
           <a:p>
             <a:fld id="{CA322229-C50A-448D-9949-3EEB7AB801DC}" type="datetimeFigureOut">
               <a:rPr lang="de-DE" smtClean="0"/>
-              <a:t>30.06.22</a:t>
+              <a:t>01.07.2022</a:t>
             </a:fld>
             <a:endParaRPr lang="de-DE"/>
           </a:p>
@@ -8331,7 +8331,7 @@
           <a:p>
             <a:fld id="{ECA46417-5E09-4EBA-9F68-AC32A47CD02A}" type="slidenum">
               <a:rPr lang="de-DE" smtClean="0"/>
-              <a:t>‹#›</a:t>
+              <a:t>‹Nr.›</a:t>
             </a:fld>
             <a:endParaRPr lang="de-DE"/>
           </a:p>
@@ -9659,7 +9659,7 @@
           <p:cNvPr id="10" name="Inhaltsplatzhalter 9">
             <a:extLst>
               <a:ext uri="{FF2B5EF4-FFF2-40B4-BE49-F238E27FC236}">
-                <a16:creationId xmlns:a16="http://schemas.microsoft.com/office/drawing/2014/main" id="{705A53A6-EABB-7CFB-1E16-3F7D44290722}"/>
+                <a16:creationId xmlns:a16="http://schemas.microsoft.com/office/drawing/2014/main" id="{B236D03D-CFA2-690E-A58A-DAA4C686BEDA}"/>
               </a:ext>
             </a:extLst>
           </p:cNvPr>
@@ -9678,15 +9678,15 @@
         </p:blipFill>
         <p:spPr>
           <a:xfrm>
-            <a:off x="838200" y="3147896"/>
-            <a:ext cx="10515600" cy="1706796"/>
+            <a:off x="838200" y="2276475"/>
+            <a:ext cx="10515600" cy="3998789"/>
           </a:xfrm>
         </p:spPr>
       </p:pic>
     </p:spTree>
     <p:extLst>
       <p:ext uri="{BB962C8B-B14F-4D97-AF65-F5344CB8AC3E}">
-        <p14:creationId xmlns:p14="http://schemas.microsoft.com/office/powerpoint/2010/main" val="4085189555"/>
+        <p14:creationId xmlns:p14="http://schemas.microsoft.com/office/powerpoint/2010/main" val="201947341"/>
       </p:ext>
     </p:extLst>
   </p:cSld>
@@ -9828,7 +9828,7 @@
           <p:cNvPr id="10" name="Inhaltsplatzhalter 9">
             <a:extLst>
               <a:ext uri="{FF2B5EF4-FFF2-40B4-BE49-F238E27FC236}">
-                <a16:creationId xmlns:a16="http://schemas.microsoft.com/office/drawing/2014/main" id="{B236D03D-CFA2-690E-A58A-DAA4C686BEDA}"/>
+                <a16:creationId xmlns:a16="http://schemas.microsoft.com/office/drawing/2014/main" id="{705A53A6-EABB-7CFB-1E16-3F7D44290722}"/>
               </a:ext>
             </a:extLst>
           </p:cNvPr>
@@ -9848,14 +9848,44 @@
         <p:spPr>
           <a:xfrm>
             <a:off x="838200" y="2276475"/>
-            <a:ext cx="10515600" cy="3998789"/>
+            <a:ext cx="10515600" cy="1706796"/>
           </a:xfrm>
+        </p:spPr>
+      </p:pic>
+      <p:pic>
+        <p:nvPicPr>
+          <p:cNvPr id="4" name="Grafik 3">
+            <a:extLst>
+              <a:ext uri="{FF2B5EF4-FFF2-40B4-BE49-F238E27FC236}">
+                <a16:creationId xmlns:a16="http://schemas.microsoft.com/office/drawing/2014/main" id="{C29C1702-32F7-B615-7FAA-16C4DE303565}"/>
+              </a:ext>
+            </a:extLst>
+          </p:cNvPr>
+          <p:cNvPicPr>
+            <a:picLocks noChangeAspect="1"/>
+          </p:cNvPicPr>
+          <p:nvPr/>
+        </p:nvPicPr>
+        <p:blipFill>
+          <a:blip r:embed="rId4"/>
+          <a:stretch>
+            <a:fillRect/>
+          </a:stretch>
+        </p:blipFill>
+        <p:spPr>
+          <a:xfrm>
+            <a:off x="838200" y="4137794"/>
+            <a:ext cx="10438504" cy="1735010"/>
+          </a:xfrm>
+          <a:prstGeom prst="rect">
+            <a:avLst/>
+          </a:prstGeom>
         </p:spPr>
       </p:pic>
     </p:spTree>
     <p:extLst>
       <p:ext uri="{BB962C8B-B14F-4D97-AF65-F5344CB8AC3E}">
-        <p14:creationId xmlns:p14="http://schemas.microsoft.com/office/powerpoint/2010/main" val="201947341"/>
+        <p14:creationId xmlns:p14="http://schemas.microsoft.com/office/powerpoint/2010/main" val="4085189555"/>
       </p:ext>
     </p:extLst>
   </p:cSld>

</xml_diff>

<commit_message>
docs: Added Changelog Endpoint (#119)
</commit_message>
<xml_diff>
--- a/docs/presentations/Service_Release_Manager_Final.pptx
+++ b/docs/presentations/Service_Release_Manager_Final.pptx
@@ -20,8 +20,8 @@
     <p:sldId id="294" r:id="rId11"/>
     <p:sldId id="292" r:id="rId12"/>
     <p:sldId id="291" r:id="rId13"/>
-    <p:sldId id="317" r:id="rId14"/>
-    <p:sldId id="299" r:id="rId15"/>
+    <p:sldId id="299" r:id="rId14"/>
+    <p:sldId id="317" r:id="rId15"/>
     <p:sldId id="300" r:id="rId16"/>
     <p:sldId id="301" r:id="rId17"/>
     <p:sldId id="302" r:id="rId18"/>
@@ -2790,7 +2790,7 @@
           <a:p>
             <a:fld id="{7935CA95-931C-EC46-822F-44CD3AAAD683}" type="datetimeFigureOut">
               <a:rPr lang="en-DE" smtClean="0"/>
-              <a:t>30.06.22</a:t>
+              <a:t>07/01/2022</a:t>
             </a:fld>
             <a:endParaRPr lang="en-DE"/>
           </a:p>
@@ -2949,7 +2949,7 @@
           <a:p>
             <a:fld id="{844F32EA-7D6E-F743-B40F-CE4285130E17}" type="slidenum">
               <a:rPr lang="en-DE" smtClean="0"/>
-              <a:t>‹#›</a:t>
+              <a:t>‹Nr.›</a:t>
             </a:fld>
             <a:endParaRPr lang="en-DE"/>
           </a:p>
@@ -3535,7 +3535,7 @@
     </p:spTree>
     <p:extLst>
       <p:ext uri="{BB962C8B-B14F-4D97-AF65-F5344CB8AC3E}">
-        <p14:creationId xmlns:p14="http://schemas.microsoft.com/office/powerpoint/2010/main" val="1220929819"/>
+        <p14:creationId xmlns:p14="http://schemas.microsoft.com/office/powerpoint/2010/main" val="3786725649"/>
       </p:ext>
     </p:extLst>
   </p:cSld>
@@ -3626,7 +3626,7 @@
     </p:spTree>
     <p:extLst>
       <p:ext uri="{BB962C8B-B14F-4D97-AF65-F5344CB8AC3E}">
-        <p14:creationId xmlns:p14="http://schemas.microsoft.com/office/powerpoint/2010/main" val="3786725649"/>
+        <p14:creationId xmlns:p14="http://schemas.microsoft.com/office/powerpoint/2010/main" val="1220929819"/>
       </p:ext>
     </p:extLst>
   </p:cSld>
@@ -5591,7 +5591,7 @@
           <a:p>
             <a:fld id="{CA322229-C50A-448D-9949-3EEB7AB801DC}" type="datetimeFigureOut">
               <a:rPr lang="de-DE" smtClean="0"/>
-              <a:t>30.06.22</a:t>
+              <a:t>01.07.2022</a:t>
             </a:fld>
             <a:endParaRPr lang="de-DE"/>
           </a:p>
@@ -5645,7 +5645,7 @@
           <a:p>
             <a:fld id="{ECA46417-5E09-4EBA-9F68-AC32A47CD02A}" type="slidenum">
               <a:rPr lang="de-DE" smtClean="0"/>
-              <a:t>‹#›</a:t>
+              <a:t>‹Nr.›</a:t>
             </a:fld>
             <a:endParaRPr lang="de-DE"/>
           </a:p>
@@ -5789,7 +5789,7 @@
           <a:p>
             <a:fld id="{CA322229-C50A-448D-9949-3EEB7AB801DC}" type="datetimeFigureOut">
               <a:rPr lang="de-DE" smtClean="0"/>
-              <a:t>30.06.22</a:t>
+              <a:t>01.07.2022</a:t>
             </a:fld>
             <a:endParaRPr lang="de-DE"/>
           </a:p>
@@ -5843,7 +5843,7 @@
           <a:p>
             <a:fld id="{ECA46417-5E09-4EBA-9F68-AC32A47CD02A}" type="slidenum">
               <a:rPr lang="de-DE" smtClean="0"/>
-              <a:t>‹#›</a:t>
+              <a:t>‹Nr.›</a:t>
             </a:fld>
             <a:endParaRPr lang="de-DE"/>
           </a:p>
@@ -5997,7 +5997,7 @@
           <a:p>
             <a:fld id="{CA322229-C50A-448D-9949-3EEB7AB801DC}" type="datetimeFigureOut">
               <a:rPr lang="de-DE" smtClean="0"/>
-              <a:t>30.06.22</a:t>
+              <a:t>01.07.2022</a:t>
             </a:fld>
             <a:endParaRPr lang="de-DE"/>
           </a:p>
@@ -6051,7 +6051,7 @@
           <a:p>
             <a:fld id="{ECA46417-5E09-4EBA-9F68-AC32A47CD02A}" type="slidenum">
               <a:rPr lang="de-DE" smtClean="0"/>
-              <a:t>‹#›</a:t>
+              <a:t>‹Nr.›</a:t>
             </a:fld>
             <a:endParaRPr lang="de-DE"/>
           </a:p>
@@ -6195,7 +6195,7 @@
           <a:p>
             <a:fld id="{CA322229-C50A-448D-9949-3EEB7AB801DC}" type="datetimeFigureOut">
               <a:rPr lang="de-DE" smtClean="0"/>
-              <a:t>30.06.22</a:t>
+              <a:t>01.07.2022</a:t>
             </a:fld>
             <a:endParaRPr lang="de-DE"/>
           </a:p>
@@ -6249,7 +6249,7 @@
           <a:p>
             <a:fld id="{ECA46417-5E09-4EBA-9F68-AC32A47CD02A}" type="slidenum">
               <a:rPr lang="de-DE" smtClean="0"/>
-              <a:t>‹#›</a:t>
+              <a:t>‹Nr.›</a:t>
             </a:fld>
             <a:endParaRPr lang="de-DE"/>
           </a:p>
@@ -6470,7 +6470,7 @@
           <a:p>
             <a:fld id="{CA322229-C50A-448D-9949-3EEB7AB801DC}" type="datetimeFigureOut">
               <a:rPr lang="de-DE" smtClean="0"/>
-              <a:t>30.06.22</a:t>
+              <a:t>01.07.2022</a:t>
             </a:fld>
             <a:endParaRPr lang="de-DE"/>
           </a:p>
@@ -6524,7 +6524,7 @@
           <a:p>
             <a:fld id="{ECA46417-5E09-4EBA-9F68-AC32A47CD02A}" type="slidenum">
               <a:rPr lang="de-DE" smtClean="0"/>
-              <a:t>‹#›</a:t>
+              <a:t>‹Nr.›</a:t>
             </a:fld>
             <a:endParaRPr lang="de-DE"/>
           </a:p>
@@ -6735,7 +6735,7 @@
           <a:p>
             <a:fld id="{CA322229-C50A-448D-9949-3EEB7AB801DC}" type="datetimeFigureOut">
               <a:rPr lang="de-DE" smtClean="0"/>
-              <a:t>30.06.22</a:t>
+              <a:t>01.07.2022</a:t>
             </a:fld>
             <a:endParaRPr lang="de-DE"/>
           </a:p>
@@ -6789,7 +6789,7 @@
           <a:p>
             <a:fld id="{ECA46417-5E09-4EBA-9F68-AC32A47CD02A}" type="slidenum">
               <a:rPr lang="de-DE" smtClean="0"/>
-              <a:t>‹#›</a:t>
+              <a:t>‹Nr.›</a:t>
             </a:fld>
             <a:endParaRPr lang="de-DE"/>
           </a:p>
@@ -7147,7 +7147,7 @@
           <a:p>
             <a:fld id="{CA322229-C50A-448D-9949-3EEB7AB801DC}" type="datetimeFigureOut">
               <a:rPr lang="de-DE" smtClean="0"/>
-              <a:t>30.06.22</a:t>
+              <a:t>01.07.2022</a:t>
             </a:fld>
             <a:endParaRPr lang="de-DE"/>
           </a:p>
@@ -7201,7 +7201,7 @@
           <a:p>
             <a:fld id="{ECA46417-5E09-4EBA-9F68-AC32A47CD02A}" type="slidenum">
               <a:rPr lang="de-DE" smtClean="0"/>
-              <a:t>‹#›</a:t>
+              <a:t>‹Nr.›</a:t>
             </a:fld>
             <a:endParaRPr lang="de-DE"/>
           </a:p>
@@ -7288,7 +7288,7 @@
           <a:p>
             <a:fld id="{CA322229-C50A-448D-9949-3EEB7AB801DC}" type="datetimeFigureOut">
               <a:rPr lang="de-DE" smtClean="0"/>
-              <a:t>30.06.22</a:t>
+              <a:t>01.07.2022</a:t>
             </a:fld>
             <a:endParaRPr lang="de-DE"/>
           </a:p>
@@ -7342,7 +7342,7 @@
           <a:p>
             <a:fld id="{ECA46417-5E09-4EBA-9F68-AC32A47CD02A}" type="slidenum">
               <a:rPr lang="de-DE" smtClean="0"/>
-              <a:t>‹#›</a:t>
+              <a:t>‹Nr.›</a:t>
             </a:fld>
             <a:endParaRPr lang="de-DE"/>
           </a:p>
@@ -7401,7 +7401,7 @@
           <a:p>
             <a:fld id="{CA322229-C50A-448D-9949-3EEB7AB801DC}" type="datetimeFigureOut">
               <a:rPr lang="de-DE" smtClean="0"/>
-              <a:t>30.06.22</a:t>
+              <a:t>01.07.2022</a:t>
             </a:fld>
             <a:endParaRPr lang="de-DE"/>
           </a:p>
@@ -7455,7 +7455,7 @@
           <a:p>
             <a:fld id="{ECA46417-5E09-4EBA-9F68-AC32A47CD02A}" type="slidenum">
               <a:rPr lang="de-DE" smtClean="0"/>
-              <a:t>‹#›</a:t>
+              <a:t>‹Nr.›</a:t>
             </a:fld>
             <a:endParaRPr lang="de-DE"/>
           </a:p>
@@ -7712,7 +7712,7 @@
           <a:p>
             <a:fld id="{CA322229-C50A-448D-9949-3EEB7AB801DC}" type="datetimeFigureOut">
               <a:rPr lang="de-DE" smtClean="0"/>
-              <a:t>30.06.22</a:t>
+              <a:t>01.07.2022</a:t>
             </a:fld>
             <a:endParaRPr lang="de-DE"/>
           </a:p>
@@ -7766,7 +7766,7 @@
           <a:p>
             <a:fld id="{ECA46417-5E09-4EBA-9F68-AC32A47CD02A}" type="slidenum">
               <a:rPr lang="de-DE" smtClean="0"/>
-              <a:t>‹#›</a:t>
+              <a:t>‹Nr.›</a:t>
             </a:fld>
             <a:endParaRPr lang="de-DE"/>
           </a:p>
@@ -8000,7 +8000,7 @@
           <a:p>
             <a:fld id="{CA322229-C50A-448D-9949-3EEB7AB801DC}" type="datetimeFigureOut">
               <a:rPr lang="de-DE" smtClean="0"/>
-              <a:t>30.06.22</a:t>
+              <a:t>01.07.2022</a:t>
             </a:fld>
             <a:endParaRPr lang="de-DE"/>
           </a:p>
@@ -8054,7 +8054,7 @@
           <a:p>
             <a:fld id="{ECA46417-5E09-4EBA-9F68-AC32A47CD02A}" type="slidenum">
               <a:rPr lang="de-DE" smtClean="0"/>
-              <a:t>‹#›</a:t>
+              <a:t>‹Nr.›</a:t>
             </a:fld>
             <a:endParaRPr lang="de-DE"/>
           </a:p>
@@ -8241,7 +8241,7 @@
           <a:p>
             <a:fld id="{CA322229-C50A-448D-9949-3EEB7AB801DC}" type="datetimeFigureOut">
               <a:rPr lang="de-DE" smtClean="0"/>
-              <a:t>30.06.22</a:t>
+              <a:t>01.07.2022</a:t>
             </a:fld>
             <a:endParaRPr lang="de-DE"/>
           </a:p>
@@ -8331,7 +8331,7 @@
           <a:p>
             <a:fld id="{ECA46417-5E09-4EBA-9F68-AC32A47CD02A}" type="slidenum">
               <a:rPr lang="de-DE" smtClean="0"/>
-              <a:t>‹#›</a:t>
+              <a:t>‹Nr.›</a:t>
             </a:fld>
             <a:endParaRPr lang="de-DE"/>
           </a:p>
@@ -9659,7 +9659,7 @@
           <p:cNvPr id="10" name="Inhaltsplatzhalter 9">
             <a:extLst>
               <a:ext uri="{FF2B5EF4-FFF2-40B4-BE49-F238E27FC236}">
-                <a16:creationId xmlns:a16="http://schemas.microsoft.com/office/drawing/2014/main" id="{705A53A6-EABB-7CFB-1E16-3F7D44290722}"/>
+                <a16:creationId xmlns:a16="http://schemas.microsoft.com/office/drawing/2014/main" id="{B236D03D-CFA2-690E-A58A-DAA4C686BEDA}"/>
               </a:ext>
             </a:extLst>
           </p:cNvPr>
@@ -9678,15 +9678,15 @@
         </p:blipFill>
         <p:spPr>
           <a:xfrm>
-            <a:off x="838200" y="3147896"/>
-            <a:ext cx="10515600" cy="1706796"/>
+            <a:off x="838200" y="2276475"/>
+            <a:ext cx="10515600" cy="3998789"/>
           </a:xfrm>
         </p:spPr>
       </p:pic>
     </p:spTree>
     <p:extLst>
       <p:ext uri="{BB962C8B-B14F-4D97-AF65-F5344CB8AC3E}">
-        <p14:creationId xmlns:p14="http://schemas.microsoft.com/office/powerpoint/2010/main" val="4085189555"/>
+        <p14:creationId xmlns:p14="http://schemas.microsoft.com/office/powerpoint/2010/main" val="201947341"/>
       </p:ext>
     </p:extLst>
   </p:cSld>
@@ -9828,7 +9828,7 @@
           <p:cNvPr id="10" name="Inhaltsplatzhalter 9">
             <a:extLst>
               <a:ext uri="{FF2B5EF4-FFF2-40B4-BE49-F238E27FC236}">
-                <a16:creationId xmlns:a16="http://schemas.microsoft.com/office/drawing/2014/main" id="{B236D03D-CFA2-690E-A58A-DAA4C686BEDA}"/>
+                <a16:creationId xmlns:a16="http://schemas.microsoft.com/office/drawing/2014/main" id="{705A53A6-EABB-7CFB-1E16-3F7D44290722}"/>
               </a:ext>
             </a:extLst>
           </p:cNvPr>
@@ -9848,14 +9848,44 @@
         <p:spPr>
           <a:xfrm>
             <a:off x="838200" y="2276475"/>
-            <a:ext cx="10515600" cy="3998789"/>
+            <a:ext cx="10515600" cy="1706796"/>
           </a:xfrm>
+        </p:spPr>
+      </p:pic>
+      <p:pic>
+        <p:nvPicPr>
+          <p:cNvPr id="4" name="Grafik 3">
+            <a:extLst>
+              <a:ext uri="{FF2B5EF4-FFF2-40B4-BE49-F238E27FC236}">
+                <a16:creationId xmlns:a16="http://schemas.microsoft.com/office/drawing/2014/main" id="{C29C1702-32F7-B615-7FAA-16C4DE303565}"/>
+              </a:ext>
+            </a:extLst>
+          </p:cNvPr>
+          <p:cNvPicPr>
+            <a:picLocks noChangeAspect="1"/>
+          </p:cNvPicPr>
+          <p:nvPr/>
+        </p:nvPicPr>
+        <p:blipFill>
+          <a:blip r:embed="rId4"/>
+          <a:stretch>
+            <a:fillRect/>
+          </a:stretch>
+        </p:blipFill>
+        <p:spPr>
+          <a:xfrm>
+            <a:off x="838200" y="4137794"/>
+            <a:ext cx="10438504" cy="1735010"/>
+          </a:xfrm>
+          <a:prstGeom prst="rect">
+            <a:avLst/>
+          </a:prstGeom>
         </p:spPr>
       </p:pic>
     </p:spTree>
     <p:extLst>
       <p:ext uri="{BB962C8B-B14F-4D97-AF65-F5344CB8AC3E}">
-        <p14:creationId xmlns:p14="http://schemas.microsoft.com/office/powerpoint/2010/main" val="201947341"/>
+        <p14:creationId xmlns:p14="http://schemas.microsoft.com/office/powerpoint/2010/main" val="4085189555"/>
       </p:ext>
     </p:extLst>
   </p:cSld>

</xml_diff>